<commit_message>
Quick updates before the workshopt
</commit_message>
<xml_diff>
--- a/Workshop/19.01.23 PM Toolbox Workshop.pptx
+++ b/Workshop/19.01.23 PM Toolbox Workshop.pptx
@@ -162,6 +162,9 @@
     <p:ext uri="{EFAFB233-063F-42B5-8137-9DF3F51BA10A}">
       <p15:sldGuideLst xmlns:p15="http://schemas.microsoft.com/office/powerpoint/2012/main"/>
     </p:ext>
+    <p:ext uri="{2D200454-40CA-4A62-9FC3-DE9A4176ACB9}">
+      <p15:notesGuideLst xmlns:p15="http://schemas.microsoft.com/office/powerpoint/2012/main"/>
+    </p:ext>
   </p:extLst>
 </p:presentation>
 </file>
@@ -248,7 +251,7 @@
           <a:p>
             <a:fld id="{EF19AD50-3AE2-4996-B15E-E66D84D4F511}" type="datetimeFigureOut">
               <a:rPr lang="en-US" smtClean="0"/>
-              <a:t>1/23/2019</a:t>
+              <a:t>1/25/2019</a:t>
             </a:fld>
             <a:endParaRPr lang="en-US"/>
           </a:p>
@@ -660,9 +663,9 @@
           <a:bodyPr/>
           <a:lstStyle/>
           <a:p>
-            <a:fld id="{F4F4B149-A39C-4D59-8638-846276849838}" type="datetimeFigureOut">
+            <a:fld id="{C093B7FF-A02C-47DC-9278-AB819467EBA2}" type="datetime1">
               <a:rPr lang="en-US" smtClean="0"/>
-              <a:t>1/23/2019</a:t>
+              <a:t>1/25/2019</a:t>
             </a:fld>
             <a:endParaRPr lang="en-US"/>
           </a:p>
@@ -858,9 +861,9 @@
           <a:bodyPr/>
           <a:lstStyle/>
           <a:p>
-            <a:fld id="{F4F4B149-A39C-4D59-8638-846276849838}" type="datetimeFigureOut">
+            <a:fld id="{AB9C5BEB-0AA8-457B-9A34-8231AFBA9294}" type="datetime1">
               <a:rPr lang="en-US" smtClean="0"/>
-              <a:t>1/23/2019</a:t>
+              <a:t>1/25/2019</a:t>
             </a:fld>
             <a:endParaRPr lang="en-US"/>
           </a:p>
@@ -1066,9 +1069,9 @@
           <a:bodyPr/>
           <a:lstStyle/>
           <a:p>
-            <a:fld id="{F4F4B149-A39C-4D59-8638-846276849838}" type="datetimeFigureOut">
+            <a:fld id="{491579F6-EE35-4652-99A4-A0DFDCA48DC0}" type="datetime1">
               <a:rPr lang="en-US" smtClean="0"/>
-              <a:t>1/23/2019</a:t>
+              <a:t>1/25/2019</a:t>
             </a:fld>
             <a:endParaRPr lang="en-US"/>
           </a:p>
@@ -1270,9 +1273,9 @@
           <a:bodyPr/>
           <a:lstStyle/>
           <a:p>
-            <a:fld id="{F4F4B149-A39C-4D59-8638-846276849838}" type="datetimeFigureOut">
+            <a:fld id="{B92870F7-552A-49D9-9F7D-5D1B92A65D6C}" type="datetime1">
               <a:rPr lang="en-US" smtClean="0"/>
-              <a:t>1/23/2019</a:t>
+              <a:t>1/25/2019</a:t>
             </a:fld>
             <a:endParaRPr lang="en-US"/>
           </a:p>
@@ -1545,9 +1548,9 @@
           <a:bodyPr/>
           <a:lstStyle/>
           <a:p>
-            <a:fld id="{F4F4B149-A39C-4D59-8638-846276849838}" type="datetimeFigureOut">
+            <a:fld id="{04CB31FC-0624-486D-B6FB-811DBDAD1971}" type="datetime1">
               <a:rPr lang="en-US" smtClean="0"/>
-              <a:t>1/23/2019</a:t>
+              <a:t>1/25/2019</a:t>
             </a:fld>
             <a:endParaRPr lang="en-US"/>
           </a:p>
@@ -1810,9 +1813,9 @@
           <a:bodyPr/>
           <a:lstStyle/>
           <a:p>
-            <a:fld id="{F4F4B149-A39C-4D59-8638-846276849838}" type="datetimeFigureOut">
+            <a:fld id="{E1AC9CC7-693C-447A-8560-3519F5C1B913}" type="datetime1">
               <a:rPr lang="en-US" smtClean="0"/>
-              <a:t>1/23/2019</a:t>
+              <a:t>1/25/2019</a:t>
             </a:fld>
             <a:endParaRPr lang="en-US"/>
           </a:p>
@@ -2222,9 +2225,9 @@
           <a:bodyPr/>
           <a:lstStyle/>
           <a:p>
-            <a:fld id="{F4F4B149-A39C-4D59-8638-846276849838}" type="datetimeFigureOut">
+            <a:fld id="{AAC5AEA3-C095-45EE-AD24-9688FFEF3D32}" type="datetime1">
               <a:rPr lang="en-US" smtClean="0"/>
-              <a:t>1/23/2019</a:t>
+              <a:t>1/25/2019</a:t>
             </a:fld>
             <a:endParaRPr lang="en-US"/>
           </a:p>
@@ -2363,9 +2366,9 @@
           <a:bodyPr/>
           <a:lstStyle/>
           <a:p>
-            <a:fld id="{F4F4B149-A39C-4D59-8638-846276849838}" type="datetimeFigureOut">
+            <a:fld id="{F98FE622-4C7E-408A-9645-88D23CF01696}" type="datetime1">
               <a:rPr lang="en-US" smtClean="0"/>
-              <a:t>1/23/2019</a:t>
+              <a:t>1/25/2019</a:t>
             </a:fld>
             <a:endParaRPr lang="en-US"/>
           </a:p>
@@ -2476,9 +2479,9 @@
           <a:bodyPr/>
           <a:lstStyle/>
           <a:p>
-            <a:fld id="{F4F4B149-A39C-4D59-8638-846276849838}" type="datetimeFigureOut">
+            <a:fld id="{BB0036FA-64F7-4FE5-9FE3-998E9176862B}" type="datetime1">
               <a:rPr lang="en-US" smtClean="0"/>
-              <a:t>1/23/2019</a:t>
+              <a:t>1/25/2019</a:t>
             </a:fld>
             <a:endParaRPr lang="en-US"/>
           </a:p>
@@ -2787,9 +2790,9 @@
           <a:bodyPr/>
           <a:lstStyle/>
           <a:p>
-            <a:fld id="{F4F4B149-A39C-4D59-8638-846276849838}" type="datetimeFigureOut">
+            <a:fld id="{3AFE1C3B-1245-4BAC-8AD1-E5BEBF0523C9}" type="datetime1">
               <a:rPr lang="en-US" smtClean="0"/>
-              <a:t>1/23/2019</a:t>
+              <a:t>1/25/2019</a:t>
             </a:fld>
             <a:endParaRPr lang="en-US"/>
           </a:p>
@@ -3075,9 +3078,9 @@
           <a:bodyPr/>
           <a:lstStyle/>
           <a:p>
-            <a:fld id="{F4F4B149-A39C-4D59-8638-846276849838}" type="datetimeFigureOut">
+            <a:fld id="{D5D9CAFA-87CF-49A9-826B-C8AE791C7114}" type="datetime1">
               <a:rPr lang="en-US" smtClean="0"/>
-              <a:t>1/23/2019</a:t>
+              <a:t>1/25/2019</a:t>
             </a:fld>
             <a:endParaRPr lang="en-US"/>
           </a:p>
@@ -3316,9 +3319,9 @@
             </a:lvl1pPr>
           </a:lstStyle>
           <a:p>
-            <a:fld id="{F4F4B149-A39C-4D59-8638-846276849838}" type="datetimeFigureOut">
+            <a:fld id="{95B2A410-5975-4354-899E-19F5D1124271}" type="datetime1">
               <a:rPr lang="en-US" smtClean="0"/>
-              <a:t>1/23/2019</a:t>
+              <a:t>1/25/2019</a:t>
             </a:fld>
             <a:endParaRPr lang="en-US"/>
           </a:p>
@@ -3465,6 +3468,7 @@
     <p:sldLayoutId id="2147483658" r:id="rId10"/>
     <p:sldLayoutId id="2147483659" r:id="rId11"/>
   </p:sldLayoutIdLst>
+  <p:hf hdr="0" ftr="0" dt="0"/>
   <p:txStyles>
     <p:titleStyle>
       <a:lvl1pPr algn="l" defTabSz="914400" rtl="0" eaLnBrk="1" latinLnBrk="0" hangingPunct="1">
@@ -3816,7 +3820,7 @@
           <a:p>
             <a:r>
               <a:rPr lang="en-US" dirty="0"/>
-              <a:t>19.01.23</a:t>
+              <a:t>19.01.25</a:t>
             </a:r>
           </a:p>
           <a:p>
@@ -3824,6 +3828,112 @@
               <a:rPr lang="en-US" dirty="0"/>
               <a:t>Mustafa Al Ibrahim</a:t>
             </a:r>
+          </a:p>
+        </p:txBody>
+      </p:sp>
+      <p:sp>
+        <p:nvSpPr>
+          <p:cNvPr id="4" name="Rectangle 3">
+            <a:extLst>
+              <a:ext uri="{FF2B5EF4-FFF2-40B4-BE49-F238E27FC236}">
+                <a16:creationId xmlns:a16="http://schemas.microsoft.com/office/drawing/2014/main" id="{E4A6B815-4D88-4A38-965F-FBFC37E5E8A1}"/>
+              </a:ext>
+            </a:extLst>
+          </p:cNvPr>
+          <p:cNvSpPr/>
+          <p:nvPr/>
+        </p:nvSpPr>
+        <p:spPr>
+          <a:xfrm>
+            <a:off x="180791" y="5349875"/>
+            <a:ext cx="11890819" cy="1077218"/>
+          </a:xfrm>
+          <a:prstGeom prst="rect">
+            <a:avLst/>
+          </a:prstGeom>
+        </p:spPr>
+        <p:txBody>
+          <a:bodyPr wrap="none">
+            <a:spAutoFit/>
+          </a:bodyPr>
+          <a:lstStyle/>
+          <a:p>
+            <a:r>
+              <a:rPr lang="en-US" sz="3200" dirty="0">
+                <a:solidFill>
+                  <a:srgbClr val="444444"/>
+                </a:solidFill>
+                <a:latin typeface="Roboto"/>
+                <a:hlinkClick r:id="rId2"/>
+              </a:rPr>
+              <a:t>https://goo.gl/AJTE8E</a:t>
+            </a:r>
+            <a:r>
+              <a:rPr lang="en-US" sz="3200" dirty="0">
+                <a:solidFill>
+                  <a:srgbClr val="444444"/>
+                </a:solidFill>
+                <a:latin typeface="Roboto"/>
+              </a:rPr>
+              <a:t>  or  </a:t>
+            </a:r>
+            <a:r>
+              <a:rPr lang="en-US" sz="3200" dirty="0">
+                <a:solidFill>
+                  <a:srgbClr val="444444"/>
+                </a:solidFill>
+                <a:latin typeface="Roboto"/>
+                <a:hlinkClick r:id="rId3"/>
+              </a:rPr>
+              <a:t>https://github.com/MosGeo/PMToolbox</a:t>
+            </a:r>
+            <a:endParaRPr lang="en-US" sz="3200" dirty="0">
+              <a:solidFill>
+                <a:srgbClr val="444444"/>
+              </a:solidFill>
+              <a:latin typeface="Roboto"/>
+            </a:endParaRPr>
+          </a:p>
+          <a:p>
+            <a:r>
+              <a:rPr lang="en-US" sz="3200" dirty="0">
+                <a:solidFill>
+                  <a:srgbClr val="444444"/>
+                </a:solidFill>
+                <a:latin typeface="Roboto"/>
+              </a:rPr>
+              <a:t> </a:t>
+            </a:r>
+            <a:endParaRPr lang="en-US" sz="3200" dirty="0"/>
+          </a:p>
+        </p:txBody>
+      </p:sp>
+      <p:sp>
+        <p:nvSpPr>
+          <p:cNvPr id="5" name="Slide Number Placeholder 4">
+            <a:extLst>
+              <a:ext uri="{FF2B5EF4-FFF2-40B4-BE49-F238E27FC236}">
+                <a16:creationId xmlns:a16="http://schemas.microsoft.com/office/drawing/2014/main" id="{24BE1FFD-604A-4746-A402-6EE019E8D7EE}"/>
+              </a:ext>
+            </a:extLst>
+          </p:cNvPr>
+          <p:cNvSpPr>
+            <a:spLocks noGrp="1"/>
+          </p:cNvSpPr>
+          <p:nvPr>
+            <p:ph type="sldNum" sz="quarter" idx="12"/>
+          </p:nvPr>
+        </p:nvSpPr>
+        <p:spPr/>
+        <p:txBody>
+          <a:bodyPr/>
+          <a:lstStyle/>
+          <a:p>
+            <a:fld id="{A14EB579-BBB4-474F-AB65-B6F585034CC1}" type="slidenum">
+              <a:rPr lang="en-US" smtClean="0"/>
+              <a:t>1</a:t>
+            </a:fld>
+            <a:endParaRPr lang="en-US"/>
           </a:p>
         </p:txBody>
       </p:sp>
@@ -4005,6 +4115,35 @@
           </a:prstGeom>
         </p:spPr>
       </p:pic>
+      <p:sp>
+        <p:nvSpPr>
+          <p:cNvPr id="4" name="Slide Number Placeholder 3">
+            <a:extLst>
+              <a:ext uri="{FF2B5EF4-FFF2-40B4-BE49-F238E27FC236}">
+                <a16:creationId xmlns:a16="http://schemas.microsoft.com/office/drawing/2014/main" id="{B276D0F2-11AE-4769-A3D1-BB5CC37BF5A6}"/>
+              </a:ext>
+            </a:extLst>
+          </p:cNvPr>
+          <p:cNvSpPr>
+            <a:spLocks noGrp="1"/>
+          </p:cNvSpPr>
+          <p:nvPr>
+            <p:ph type="sldNum" sz="quarter" idx="12"/>
+          </p:nvPr>
+        </p:nvSpPr>
+        <p:spPr/>
+        <p:txBody>
+          <a:bodyPr/>
+          <a:lstStyle/>
+          <a:p>
+            <a:fld id="{A14EB579-BBB4-474F-AB65-B6F585034CC1}" type="slidenum">
+              <a:rPr lang="en-US" smtClean="0"/>
+              <a:t>10</a:t>
+            </a:fld>
+            <a:endParaRPr lang="en-US"/>
+          </a:p>
+        </p:txBody>
+      </p:sp>
     </p:spTree>
     <p:extLst>
       <p:ext uri="{BB962C8B-B14F-4D97-AF65-F5344CB8AC3E}">
@@ -4161,6 +4300,35 @@
           </a:p>
         </p:txBody>
       </p:sp>
+      <p:sp>
+        <p:nvSpPr>
+          <p:cNvPr id="4" name="Slide Number Placeholder 3">
+            <a:extLst>
+              <a:ext uri="{FF2B5EF4-FFF2-40B4-BE49-F238E27FC236}">
+                <a16:creationId xmlns:a16="http://schemas.microsoft.com/office/drawing/2014/main" id="{83DB3126-9A23-425C-BE18-1487F8C506B0}"/>
+              </a:ext>
+            </a:extLst>
+          </p:cNvPr>
+          <p:cNvSpPr>
+            <a:spLocks noGrp="1"/>
+          </p:cNvSpPr>
+          <p:nvPr>
+            <p:ph type="sldNum" sz="quarter" idx="12"/>
+          </p:nvPr>
+        </p:nvSpPr>
+        <p:spPr/>
+        <p:txBody>
+          <a:bodyPr/>
+          <a:lstStyle/>
+          <a:p>
+            <a:fld id="{A14EB579-BBB4-474F-AB65-B6F585034CC1}" type="slidenum">
+              <a:rPr lang="en-US" smtClean="0"/>
+              <a:t>11</a:t>
+            </a:fld>
+            <a:endParaRPr lang="en-US"/>
+          </a:p>
+        </p:txBody>
+      </p:sp>
     </p:spTree>
     <p:extLst>
       <p:ext uri="{BB962C8B-B14F-4D97-AF65-F5344CB8AC3E}">
@@ -4315,6 +4483,35 @@
           </a:p>
         </p:txBody>
       </p:sp>
+      <p:sp>
+        <p:nvSpPr>
+          <p:cNvPr id="4" name="Slide Number Placeholder 3">
+            <a:extLst>
+              <a:ext uri="{FF2B5EF4-FFF2-40B4-BE49-F238E27FC236}">
+                <a16:creationId xmlns:a16="http://schemas.microsoft.com/office/drawing/2014/main" id="{ECB997F6-A95B-4154-BCFD-83BF78B7F00D}"/>
+              </a:ext>
+            </a:extLst>
+          </p:cNvPr>
+          <p:cNvSpPr>
+            <a:spLocks noGrp="1"/>
+          </p:cNvSpPr>
+          <p:nvPr>
+            <p:ph type="sldNum" sz="quarter" idx="12"/>
+          </p:nvPr>
+        </p:nvSpPr>
+        <p:spPr/>
+        <p:txBody>
+          <a:bodyPr/>
+          <a:lstStyle/>
+          <a:p>
+            <a:fld id="{A14EB579-BBB4-474F-AB65-B6F585034CC1}" type="slidenum">
+              <a:rPr lang="en-US" smtClean="0"/>
+              <a:t>12</a:t>
+            </a:fld>
+            <a:endParaRPr lang="en-US"/>
+          </a:p>
+        </p:txBody>
+      </p:sp>
     </p:spTree>
     <p:extLst>
       <p:ext uri="{BB962C8B-B14F-4D97-AF65-F5344CB8AC3E}">
@@ -4477,6 +4674,35 @@
           </a:p>
         </p:txBody>
       </p:sp>
+      <p:sp>
+        <p:nvSpPr>
+          <p:cNvPr id="4" name="Slide Number Placeholder 3">
+            <a:extLst>
+              <a:ext uri="{FF2B5EF4-FFF2-40B4-BE49-F238E27FC236}">
+                <a16:creationId xmlns:a16="http://schemas.microsoft.com/office/drawing/2014/main" id="{F93BB2B0-3573-4A48-8426-E364E1E7AAD1}"/>
+              </a:ext>
+            </a:extLst>
+          </p:cNvPr>
+          <p:cNvSpPr>
+            <a:spLocks noGrp="1"/>
+          </p:cNvSpPr>
+          <p:nvPr>
+            <p:ph type="sldNum" sz="quarter" idx="12"/>
+          </p:nvPr>
+        </p:nvSpPr>
+        <p:spPr/>
+        <p:txBody>
+          <a:bodyPr/>
+          <a:lstStyle/>
+          <a:p>
+            <a:fld id="{A14EB579-BBB4-474F-AB65-B6F585034CC1}" type="slidenum">
+              <a:rPr lang="en-US" smtClean="0"/>
+              <a:t>13</a:t>
+            </a:fld>
+            <a:endParaRPr lang="en-US"/>
+          </a:p>
+        </p:txBody>
+      </p:sp>
     </p:spTree>
     <p:extLst>
       <p:ext uri="{BB962C8B-B14F-4D97-AF65-F5344CB8AC3E}">
@@ -4711,6 +4937,35 @@
               <a:t>. time…</a:t>
             </a:r>
             <a:endParaRPr lang="en-US" dirty="0"/>
+          </a:p>
+        </p:txBody>
+      </p:sp>
+      <p:sp>
+        <p:nvSpPr>
+          <p:cNvPr id="4" name="Slide Number Placeholder 3">
+            <a:extLst>
+              <a:ext uri="{FF2B5EF4-FFF2-40B4-BE49-F238E27FC236}">
+                <a16:creationId xmlns:a16="http://schemas.microsoft.com/office/drawing/2014/main" id="{AA5B5236-6166-4833-9D97-FFF45C7CF802}"/>
+              </a:ext>
+            </a:extLst>
+          </p:cNvPr>
+          <p:cNvSpPr>
+            <a:spLocks noGrp="1"/>
+          </p:cNvSpPr>
+          <p:nvPr>
+            <p:ph type="sldNum" sz="quarter" idx="12"/>
+          </p:nvPr>
+        </p:nvSpPr>
+        <p:spPr/>
+        <p:txBody>
+          <a:bodyPr/>
+          <a:lstStyle/>
+          <a:p>
+            <a:fld id="{A14EB579-BBB4-474F-AB65-B6F585034CC1}" type="slidenum">
+              <a:rPr lang="en-US" smtClean="0"/>
+              <a:t>14</a:t>
+            </a:fld>
+            <a:endParaRPr lang="en-US"/>
           </a:p>
         </p:txBody>
       </p:sp>
@@ -5799,7 +6054,7 @@
         </p:nvSpPr>
         <p:spPr>
           <a:xfrm>
-            <a:off x="6173585" y="5402753"/>
+            <a:off x="6118008" y="5405404"/>
             <a:ext cx="527709" cy="369332"/>
           </a:xfrm>
           <a:prstGeom prst="rect">
@@ -6125,6 +6380,121 @@
           </a:prstGeom>
         </p:spPr>
       </p:pic>
+      <p:sp>
+        <p:nvSpPr>
+          <p:cNvPr id="3" name="Rectangle 2">
+            <a:extLst>
+              <a:ext uri="{FF2B5EF4-FFF2-40B4-BE49-F238E27FC236}">
+                <a16:creationId xmlns:a16="http://schemas.microsoft.com/office/drawing/2014/main" id="{D7CDF9AD-6AA2-404D-9C82-7BF301BE501E}"/>
+              </a:ext>
+            </a:extLst>
+          </p:cNvPr>
+          <p:cNvSpPr/>
+          <p:nvPr/>
+        </p:nvSpPr>
+        <p:spPr>
+          <a:xfrm>
+            <a:off x="152400" y="6223821"/>
+            <a:ext cx="2480166" cy="369332"/>
+          </a:xfrm>
+          <a:prstGeom prst="rect">
+            <a:avLst/>
+          </a:prstGeom>
+        </p:spPr>
+        <p:txBody>
+          <a:bodyPr wrap="none">
+            <a:spAutoFit/>
+          </a:bodyPr>
+          <a:lstStyle/>
+          <a:p>
+            <a:r>
+              <a:rPr lang="en-US" dirty="0">
+                <a:solidFill>
+                  <a:srgbClr val="444444"/>
+                </a:solidFill>
+                <a:latin typeface="Roboto"/>
+                <a:hlinkClick r:id="rId10"/>
+              </a:rPr>
+              <a:t>https://goo.gl/AJTE8E</a:t>
+            </a:r>
+            <a:r>
+              <a:rPr lang="en-US" dirty="0">
+                <a:solidFill>
+                  <a:srgbClr val="444444"/>
+                </a:solidFill>
+                <a:latin typeface="Roboto"/>
+              </a:rPr>
+              <a:t> </a:t>
+            </a:r>
+            <a:endParaRPr lang="en-US" dirty="0"/>
+          </a:p>
+        </p:txBody>
+      </p:sp>
+      <p:sp>
+        <p:nvSpPr>
+          <p:cNvPr id="34" name="TextBox 33">
+            <a:extLst>
+              <a:ext uri="{FF2B5EF4-FFF2-40B4-BE49-F238E27FC236}">
+                <a16:creationId xmlns:a16="http://schemas.microsoft.com/office/drawing/2014/main" id="{DA0C9B72-BD3A-48B9-A388-D0689C78C9A2}"/>
+              </a:ext>
+            </a:extLst>
+          </p:cNvPr>
+          <p:cNvSpPr txBox="1"/>
+          <p:nvPr/>
+        </p:nvSpPr>
+        <p:spPr>
+          <a:xfrm>
+            <a:off x="108058" y="5883827"/>
+            <a:ext cx="2457450" cy="369332"/>
+          </a:xfrm>
+          <a:prstGeom prst="rect">
+            <a:avLst/>
+          </a:prstGeom>
+          <a:noFill/>
+        </p:spPr>
+        <p:txBody>
+          <a:bodyPr wrap="square" rtlCol="0">
+            <a:spAutoFit/>
+          </a:bodyPr>
+          <a:lstStyle/>
+          <a:p>
+            <a:pPr algn="ctr"/>
+            <a:r>
+              <a:rPr lang="en-US" dirty="0"/>
+              <a:t>Slides and code</a:t>
+            </a:r>
+          </a:p>
+        </p:txBody>
+      </p:sp>
+      <p:sp>
+        <p:nvSpPr>
+          <p:cNvPr id="4" name="Slide Number Placeholder 3">
+            <a:extLst>
+              <a:ext uri="{FF2B5EF4-FFF2-40B4-BE49-F238E27FC236}">
+                <a16:creationId xmlns:a16="http://schemas.microsoft.com/office/drawing/2014/main" id="{EA666238-B9F2-40D9-8CD5-D8E3795C320F}"/>
+              </a:ext>
+            </a:extLst>
+          </p:cNvPr>
+          <p:cNvSpPr>
+            <a:spLocks noGrp="1"/>
+          </p:cNvSpPr>
+          <p:nvPr>
+            <p:ph type="sldNum" sz="quarter" idx="12"/>
+          </p:nvPr>
+        </p:nvSpPr>
+        <p:spPr/>
+        <p:txBody>
+          <a:bodyPr/>
+          <a:lstStyle/>
+          <a:p>
+            <a:fld id="{A14EB579-BBB4-474F-AB65-B6F585034CC1}" type="slidenum">
+              <a:rPr lang="en-US" smtClean="0"/>
+              <a:t>2</a:t>
+            </a:fld>
+            <a:endParaRPr lang="en-US"/>
+          </a:p>
+        </p:txBody>
+      </p:sp>
     </p:spTree>
     <p:extLst>
       <p:ext uri="{BB962C8B-B14F-4D97-AF65-F5344CB8AC3E}">
@@ -6291,6 +6661,35 @@
           </a:p>
         </p:txBody>
       </p:sp>
+      <p:sp>
+        <p:nvSpPr>
+          <p:cNvPr id="4" name="Slide Number Placeholder 3">
+            <a:extLst>
+              <a:ext uri="{FF2B5EF4-FFF2-40B4-BE49-F238E27FC236}">
+                <a16:creationId xmlns:a16="http://schemas.microsoft.com/office/drawing/2014/main" id="{1490A338-4572-4776-9260-9D36ED6D41FE}"/>
+              </a:ext>
+            </a:extLst>
+          </p:cNvPr>
+          <p:cNvSpPr>
+            <a:spLocks noGrp="1"/>
+          </p:cNvSpPr>
+          <p:nvPr>
+            <p:ph type="sldNum" sz="quarter" idx="12"/>
+          </p:nvPr>
+        </p:nvSpPr>
+        <p:spPr/>
+        <p:txBody>
+          <a:bodyPr/>
+          <a:lstStyle/>
+          <a:p>
+            <a:fld id="{A14EB579-BBB4-474F-AB65-B6F585034CC1}" type="slidenum">
+              <a:rPr lang="en-US" smtClean="0"/>
+              <a:t>3</a:t>
+            </a:fld>
+            <a:endParaRPr lang="en-US"/>
+          </a:p>
+        </p:txBody>
+      </p:sp>
     </p:spTree>
     <p:extLst>
       <p:ext uri="{BB962C8B-B14F-4D97-AF65-F5344CB8AC3E}">
@@ -6441,7 +6840,7 @@
         </p:nvSpPr>
         <p:spPr>
           <a:xfrm>
-            <a:off x="9347202" y="5894169"/>
+            <a:off x="9356438" y="5629561"/>
             <a:ext cx="2438399" cy="646331"/>
           </a:xfrm>
           <a:prstGeom prst="rect">
@@ -6464,6 +6863,35 @@
               <a:rPr lang="en-US" dirty="0"/>
               <a:t>*I have not tested 3D models extensively</a:t>
             </a:r>
+          </a:p>
+        </p:txBody>
+      </p:sp>
+      <p:sp>
+        <p:nvSpPr>
+          <p:cNvPr id="5" name="Slide Number Placeholder 4">
+            <a:extLst>
+              <a:ext uri="{FF2B5EF4-FFF2-40B4-BE49-F238E27FC236}">
+                <a16:creationId xmlns:a16="http://schemas.microsoft.com/office/drawing/2014/main" id="{5CF04D38-B19E-4564-8077-25AC3B314E6B}"/>
+              </a:ext>
+            </a:extLst>
+          </p:cNvPr>
+          <p:cNvSpPr>
+            <a:spLocks noGrp="1"/>
+          </p:cNvSpPr>
+          <p:nvPr>
+            <p:ph type="sldNum" sz="quarter" idx="12"/>
+          </p:nvPr>
+        </p:nvSpPr>
+        <p:spPr/>
+        <p:txBody>
+          <a:bodyPr/>
+          <a:lstStyle/>
+          <a:p>
+            <a:fld id="{A14EB579-BBB4-474F-AB65-B6F585034CC1}" type="slidenum">
+              <a:rPr lang="en-US" smtClean="0"/>
+              <a:t>4</a:t>
+            </a:fld>
+            <a:endParaRPr lang="en-US"/>
           </a:p>
         </p:txBody>
       </p:sp>
@@ -6798,7 +7226,7 @@
         </p:nvSpPr>
         <p:spPr>
           <a:xfrm>
-            <a:off x="273039" y="6176962"/>
+            <a:off x="273040" y="6033184"/>
             <a:ext cx="11766561" cy="646331"/>
           </a:xfrm>
           <a:prstGeom prst="rect">
@@ -6821,6 +7249,35 @@
               <a:rPr lang="en-US" dirty="0"/>
               <a:t>  lithologies, e.g., a rock with a mineral.</a:t>
             </a:r>
+          </a:p>
+        </p:txBody>
+      </p:sp>
+      <p:sp>
+        <p:nvSpPr>
+          <p:cNvPr id="3" name="Slide Number Placeholder 2">
+            <a:extLst>
+              <a:ext uri="{FF2B5EF4-FFF2-40B4-BE49-F238E27FC236}">
+                <a16:creationId xmlns:a16="http://schemas.microsoft.com/office/drawing/2014/main" id="{BF2147EE-2A72-4CCA-BD32-091205E5AEBD}"/>
+              </a:ext>
+            </a:extLst>
+          </p:cNvPr>
+          <p:cNvSpPr>
+            <a:spLocks noGrp="1"/>
+          </p:cNvSpPr>
+          <p:nvPr>
+            <p:ph type="sldNum" sz="quarter" idx="12"/>
+          </p:nvPr>
+        </p:nvSpPr>
+        <p:spPr/>
+        <p:txBody>
+          <a:bodyPr/>
+          <a:lstStyle/>
+          <a:p>
+            <a:fld id="{A14EB579-BBB4-474F-AB65-B6F585034CC1}" type="slidenum">
+              <a:rPr lang="en-US" smtClean="0"/>
+              <a:t>5</a:t>
+            </a:fld>
+            <a:endParaRPr lang="en-US"/>
           </a:p>
         </p:txBody>
       </p:sp>
@@ -7142,6 +7599,35 @@
           </a:p>
         </p:txBody>
       </p:sp>
+      <p:sp>
+        <p:nvSpPr>
+          <p:cNvPr id="3" name="Slide Number Placeholder 2">
+            <a:extLst>
+              <a:ext uri="{FF2B5EF4-FFF2-40B4-BE49-F238E27FC236}">
+                <a16:creationId xmlns:a16="http://schemas.microsoft.com/office/drawing/2014/main" id="{7AEF4D17-ACFB-4220-AEDA-B7E15BD08A7C}"/>
+              </a:ext>
+            </a:extLst>
+          </p:cNvPr>
+          <p:cNvSpPr>
+            <a:spLocks noGrp="1"/>
+          </p:cNvSpPr>
+          <p:nvPr>
+            <p:ph type="sldNum" sz="quarter" idx="12"/>
+          </p:nvPr>
+        </p:nvSpPr>
+        <p:spPr/>
+        <p:txBody>
+          <a:bodyPr/>
+          <a:lstStyle/>
+          <a:p>
+            <a:fld id="{A14EB579-BBB4-474F-AB65-B6F585034CC1}" type="slidenum">
+              <a:rPr lang="en-US" smtClean="0"/>
+              <a:t>6</a:t>
+            </a:fld>
+            <a:endParaRPr lang="en-US"/>
+          </a:p>
+        </p:txBody>
+      </p:sp>
     </p:spTree>
     <p:extLst>
       <p:ext uri="{BB962C8B-B14F-4D97-AF65-F5344CB8AC3E}">
@@ -7258,6 +7744,35 @@
           </a:p>
         </p:txBody>
       </p:sp>
+      <p:sp>
+        <p:nvSpPr>
+          <p:cNvPr id="4" name="Slide Number Placeholder 3">
+            <a:extLst>
+              <a:ext uri="{FF2B5EF4-FFF2-40B4-BE49-F238E27FC236}">
+                <a16:creationId xmlns:a16="http://schemas.microsoft.com/office/drawing/2014/main" id="{CCFBA2CE-92FA-4E85-925E-3FDF11BF9A02}"/>
+              </a:ext>
+            </a:extLst>
+          </p:cNvPr>
+          <p:cNvSpPr>
+            <a:spLocks noGrp="1"/>
+          </p:cNvSpPr>
+          <p:nvPr>
+            <p:ph type="sldNum" sz="quarter" idx="12"/>
+          </p:nvPr>
+        </p:nvSpPr>
+        <p:spPr/>
+        <p:txBody>
+          <a:bodyPr/>
+          <a:lstStyle/>
+          <a:p>
+            <a:fld id="{A14EB579-BBB4-474F-AB65-B6F585034CC1}" type="slidenum">
+              <a:rPr lang="en-US" smtClean="0"/>
+              <a:t>7</a:t>
+            </a:fld>
+            <a:endParaRPr lang="en-US"/>
+          </a:p>
+        </p:txBody>
+      </p:sp>
     </p:spTree>
     <p:extLst>
       <p:ext uri="{BB962C8B-B14F-4D97-AF65-F5344CB8AC3E}">
@@ -7959,8 +8474,8 @@
           </a:p>
         </p:txBody>
       </p:sp>
-      <mc:AlternateContent xmlns:mc="http://schemas.openxmlformats.org/markup-compatibility/2006">
-        <mc:Choice xmlns:a14="http://schemas.microsoft.com/office/drawing/2010/main" Requires="a14">
+      <mc:AlternateContent xmlns:mc="http://schemas.openxmlformats.org/markup-compatibility/2006" xmlns:a14="http://schemas.microsoft.com/office/drawing/2010/main">
+        <mc:Choice Requires="a14">
           <p:sp>
             <p:nvSpPr>
               <p:cNvPr id="43" name="TextBox 42">
@@ -8016,7 +8531,7 @@
             </p:txBody>
           </p:sp>
         </mc:Choice>
-        <mc:Fallback>
+        <mc:Fallback xmlns="">
           <p:sp>
             <p:nvSpPr>
               <p:cNvPr id="43" name="TextBox 42">
@@ -8061,8 +8576,8 @@
           </p:sp>
         </mc:Fallback>
       </mc:AlternateContent>
-      <mc:AlternateContent xmlns:mc="http://schemas.openxmlformats.org/markup-compatibility/2006">
-        <mc:Choice xmlns:a14="http://schemas.microsoft.com/office/drawing/2010/main" Requires="a14">
+      <mc:AlternateContent xmlns:mc="http://schemas.openxmlformats.org/markup-compatibility/2006" xmlns:a14="http://schemas.microsoft.com/office/drawing/2010/main">
+        <mc:Choice Requires="a14">
           <p:sp>
             <p:nvSpPr>
               <p:cNvPr id="44" name="TextBox 43">
@@ -8118,7 +8633,7 @@
             </p:txBody>
           </p:sp>
         </mc:Choice>
-        <mc:Fallback>
+        <mc:Fallback xmlns="">
           <p:sp>
             <p:nvSpPr>
               <p:cNvPr id="44" name="TextBox 43">
@@ -8163,8 +8678,8 @@
           </p:sp>
         </mc:Fallback>
       </mc:AlternateContent>
-      <mc:AlternateContent xmlns:mc="http://schemas.openxmlformats.org/markup-compatibility/2006">
-        <mc:Choice xmlns:a14="http://schemas.microsoft.com/office/drawing/2010/main" Requires="a14">
+      <mc:AlternateContent xmlns:mc="http://schemas.openxmlformats.org/markup-compatibility/2006" xmlns:a14="http://schemas.microsoft.com/office/drawing/2010/main">
+        <mc:Choice Requires="a14">
           <p:sp>
             <p:nvSpPr>
               <p:cNvPr id="45" name="TextBox 44">
@@ -8220,7 +8735,7 @@
             </p:txBody>
           </p:sp>
         </mc:Choice>
-        <mc:Fallback>
+        <mc:Fallback xmlns="">
           <p:sp>
             <p:nvSpPr>
               <p:cNvPr id="45" name="TextBox 44">
@@ -8626,7 +9141,7 @@
         </p:nvSpPr>
         <p:spPr>
           <a:xfrm>
-            <a:off x="6173585" y="4968648"/>
+            <a:off x="6118008" y="4959186"/>
             <a:ext cx="527709" cy="369332"/>
           </a:xfrm>
           <a:prstGeom prst="rect">
@@ -9268,8 +9783,8 @@
         </p:nvSpPr>
         <p:spPr>
           <a:xfrm>
-            <a:off x="9600404" y="6357116"/>
-            <a:ext cx="2834165" cy="523708"/>
+            <a:off x="9571904" y="5803202"/>
+            <a:ext cx="2743201" cy="523708"/>
           </a:xfrm>
           <a:prstGeom prst="rect">
             <a:avLst/>
@@ -9741,6 +10256,35 @@
           </a:fontRef>
         </p:style>
       </p:cxnSp>
+      <p:sp>
+        <p:nvSpPr>
+          <p:cNvPr id="2" name="Slide Number Placeholder 1">
+            <a:extLst>
+              <a:ext uri="{FF2B5EF4-FFF2-40B4-BE49-F238E27FC236}">
+                <a16:creationId xmlns:a16="http://schemas.microsoft.com/office/drawing/2014/main" id="{8295F86E-F71E-443A-A715-FB89A7153354}"/>
+              </a:ext>
+            </a:extLst>
+          </p:cNvPr>
+          <p:cNvSpPr>
+            <a:spLocks noGrp="1"/>
+          </p:cNvSpPr>
+          <p:nvPr>
+            <p:ph type="sldNum" sz="quarter" idx="12"/>
+          </p:nvPr>
+        </p:nvSpPr>
+        <p:spPr/>
+        <p:txBody>
+          <a:bodyPr/>
+          <a:lstStyle/>
+          <a:p>
+            <a:fld id="{A14EB579-BBB4-474F-AB65-B6F585034CC1}" type="slidenum">
+              <a:rPr lang="en-US" smtClean="0"/>
+              <a:t>8</a:t>
+            </a:fld>
+            <a:endParaRPr lang="en-US"/>
+          </a:p>
+        </p:txBody>
+      </p:sp>
     </p:spTree>
     <p:extLst>
       <p:ext uri="{BB962C8B-B14F-4D97-AF65-F5344CB8AC3E}">
@@ -9884,6 +10428,35 @@
               <a:rPr lang="en-US" dirty="0"/>
               <a:t>If you can’t identify the location of a parameter, insert a “crazy” value in it to quickly identify it or test two different values and see what changes.</a:t>
             </a:r>
+          </a:p>
+        </p:txBody>
+      </p:sp>
+      <p:sp>
+        <p:nvSpPr>
+          <p:cNvPr id="4" name="Slide Number Placeholder 3">
+            <a:extLst>
+              <a:ext uri="{FF2B5EF4-FFF2-40B4-BE49-F238E27FC236}">
+                <a16:creationId xmlns:a16="http://schemas.microsoft.com/office/drawing/2014/main" id="{A08A9DFD-83AF-4CCB-817A-B4365F5E6A33}"/>
+              </a:ext>
+            </a:extLst>
+          </p:cNvPr>
+          <p:cNvSpPr>
+            <a:spLocks noGrp="1"/>
+          </p:cNvSpPr>
+          <p:nvPr>
+            <p:ph type="sldNum" sz="quarter" idx="12"/>
+          </p:nvPr>
+        </p:nvSpPr>
+        <p:spPr/>
+        <p:txBody>
+          <a:bodyPr/>
+          <a:lstStyle/>
+          <a:p>
+            <a:fld id="{A14EB579-BBB4-474F-AB65-B6F585034CC1}" type="slidenum">
+              <a:rPr lang="en-US" smtClean="0"/>
+              <a:t>9</a:t>
+            </a:fld>
+            <a:endParaRPr lang="en-US"/>
           </a:p>
         </p:txBody>
       </p:sp>

</xml_diff>

<commit_message>
Organized report and workshop
</commit_message>
<xml_diff>
--- a/Workshop/19.01.23 PM Toolbox Workshop.pptx
+++ b/Workshop/19.01.23 PM Toolbox Workshop.pptx
@@ -3863,16 +3863,7 @@
               <a:rPr lang="en-US" sz="3200" dirty="0">
                 <a:hlinkClick r:id="rId2"/>
               </a:rPr>
-              <a:t>https://github.com/MosGeo/AutoBPSMToolbox</a:t>
-            </a:r>
-            <a:r>
-              <a:rPr lang="en-US" sz="3200" dirty="0">
-                <a:solidFill>
-                  <a:srgbClr val="444444"/>
-                </a:solidFill>
-                <a:latin typeface="Roboto"/>
-              </a:rPr>
-              <a:t> </a:t>
+              <a:t>https://github.com/MosGeo/BPSMAutoToolbox</a:t>
             </a:r>
             <a:endParaRPr lang="en-US" sz="3200" dirty="0"/>
           </a:p>
@@ -3995,18 +3986,12 @@
               <a:buNone/>
             </a:pPr>
             <a:r>
-              <a:rPr lang="en-US" sz="4000" dirty="0">
+              <a:rPr lang="en-US" sz="4400" dirty="0">
                 <a:hlinkClick r:id="rId2"/>
               </a:rPr>
-              <a:t>https://github.com/MosGeo/AutoBPSMToolbox</a:t>
-            </a:r>
-            <a:endParaRPr lang="en-US" sz="3600" dirty="0"/>
-          </a:p>
-          <a:p>
-            <a:pPr marL="0" indent="0">
-              <a:buNone/>
-            </a:pPr>
-            <a:endParaRPr lang="en-US" dirty="0"/>
+              <a:t>https://github.com/MosGeo/BPSMAutoToolbox</a:t>
+            </a:r>
+            <a:endParaRPr lang="en-US" sz="4400" dirty="0"/>
           </a:p>
           <a:p>
             <a:pPr marL="0" indent="0">
@@ -4237,7 +4222,19 @@
               <a:rPr lang="en-US" dirty="0">
                 <a:sym typeface="Wingdings" panose="05000000000000000000" pitchFamily="2" charset="2"/>
               </a:rPr>
-              <a:t>Maintain compatibility with over PM toolbox versions </a:t>
+              <a:t>Maintain compatibility with over </a:t>
+            </a:r>
+            <a:r>
+              <a:rPr lang="en-US" dirty="0" err="1">
+                <a:sym typeface="Wingdings" panose="05000000000000000000" pitchFamily="2" charset="2"/>
+              </a:rPr>
+              <a:t>Petromod</a:t>
+            </a:r>
+            <a:r>
+              <a:rPr lang="en-US" dirty="0">
+                <a:sym typeface="Wingdings" panose="05000000000000000000" pitchFamily="2" charset="2"/>
+              </a:rPr>
+              <a:t> versions </a:t>
             </a:r>
             <a:endParaRPr lang="en-US" dirty="0"/>
           </a:p>

</xml_diff>